<commit_message>
Minor update to schedule to reorder itms and add Work travel week. Much added to CDR doc Some items added to PDR for items missing from presentation. Not fir resubmission, but for a better example later on.
</commit_message>
<xml_diff>
--- a/Docs/pdr_wtoner_2015fall.pptx
+++ b/Docs/pdr_wtoner_2015fall.pptx
@@ -18,6 +18,8 @@
     <p:sldId id="265" r:id="rId13"/>
     <p:sldId id="266" r:id="rId14"/>
     <p:sldId id="267" r:id="rId15"/>
+    <p:sldId id="268" r:id="rId16"/>
+    <p:sldId id="269" r:id="rId17"/>
   </p:sldIdLst>
   <p:sldSz cx="12192000" cy="6858000"/>
   <p:notesSz cx="7772400" cy="10058400"/>
@@ -2477,7 +2479,7 @@
                 <a:spcPct val="100000"/>
               </a:lnSpc>
             </a:pPr>
-            <a:fld id="{016AB920-D557-4733-98A9-31C285843250}" type="slidenum">
+            <a:fld id="{4D2F3A8A-2E71-483C-ABD8-406F1D7AD5C3}" type="slidenum">
               <a:rPr lang="en-US" sz="1200">
                 <a:solidFill>
                   <a:srgbClr val="8b8b8b"/>
@@ -2994,7 +2996,7 @@
                 <a:spcPct val="100000"/>
               </a:lnSpc>
             </a:pPr>
-            <a:fld id="{27BC386E-C05E-4009-A73E-3E0BB8DE134D}" type="slidenum">
+            <a:fld id="{6E569234-981A-4C91-809A-A2D833594C1D}" type="slidenum">
               <a:rPr lang="en-US" sz="1200">
                 <a:solidFill>
                   <a:srgbClr val="8b8b8b"/>
@@ -3481,6 +3483,219 @@
       </p:par>
     </p:tnLst>
   </p:timing>
+</p:sld>
+</file>
+
+<file path=ppt/slides/slide13.xml><?xml version="1.0" encoding="utf-8"?>
+<p:sld xmlns:a="http://schemas.openxmlformats.org/drawingml/2006/main" xmlns:p="http://schemas.openxmlformats.org/presentationml/2006/main" xmlns:r="http://schemas.openxmlformats.org/officeDocument/2006/relationships">
+  <p:cSld>
+    <p:spTree>
+      <p:nvGrpSpPr>
+        <p:cNvPr id="1" name=""/>
+        <p:cNvGrpSpPr/>
+        <p:nvPr/>
+      </p:nvGrpSpPr>
+      <p:grpSpPr>
+        <a:xfrm>
+          <a:off x="0" y="0"/>
+          <a:ext cx="0" cy="0"/>
+          <a:chOff x="0" y="0"/>
+          <a:chExt cx="0" cy="0"/>
+        </a:xfrm>
+      </p:grpSpPr>
+      <p:sp>
+        <p:nvSpPr>
+          <p:cNvPr id="106" name="TextShape 1"/>
+          <p:cNvSpPr txBox="1"/>
+          <p:nvPr/>
+        </p:nvSpPr>
+        <p:spPr>
+          <a:xfrm>
+            <a:off x="838080" y="365040"/>
+            <a:ext cx="10515240" cy="1325160"/>
+          </a:xfrm>
+          <a:prstGeom prst="rect">
+            <a:avLst/>
+          </a:prstGeom>
+        </p:spPr>
+        <p:txBody>
+          <a:bodyPr wrap="none" lIns="0" rIns="0" tIns="0" bIns="0" anchor="ctr"/>
+          <a:p>
+            <a:r>
+              <a:rPr lang="en-US" sz="4400"/>
+              <a:t>Risks</a:t>
+            </a:r>
+            <a:endParaRPr/>
+          </a:p>
+        </p:txBody>
+      </p:sp>
+    </p:spTree>
+  </p:cSld>
+  <p:timing>
+    <p:tnLst>
+      <p:par>
+        <p:cTn id="25" dur="indefinite" restart="never" nodeType="tmRoot">
+          <p:childTnLst>
+            <p:seq>
+              <p:cTn id="26" nodeType="mainSeq"/>
+              <p:prevCondLst>
+                <p:cond delay="0" evt="onPrev">
+                  <p:tgtEl>
+                    <p:sldTgt/>
+                  </p:tgtEl>
+                </p:cond>
+              </p:prevCondLst>
+              <p:nextCondLst>
+                <p:cond delay="0" evt="onNext">
+                  <p:tgtEl>
+                    <p:sldTgt/>
+                  </p:tgtEl>
+                </p:cond>
+              </p:nextCondLst>
+            </p:seq>
+          </p:childTnLst>
+        </p:cTn>
+      </p:par>
+    </p:tnLst>
+  </p:timing>
+</p:sld>
+</file>
+
+<file path=ppt/slides/slide14.xml><?xml version="1.0" encoding="utf-8"?>
+<p:sld xmlns:a="http://schemas.openxmlformats.org/drawingml/2006/main" xmlns:p="http://schemas.openxmlformats.org/presentationml/2006/main" xmlns:r="http://schemas.openxmlformats.org/officeDocument/2006/relationships">
+  <p:cSld>
+    <p:spTree>
+      <p:nvGrpSpPr>
+        <p:cNvPr id="1" name=""/>
+        <p:cNvGrpSpPr/>
+        <p:nvPr/>
+      </p:nvGrpSpPr>
+      <p:grpSpPr>
+        <a:xfrm>
+          <a:off x="0" y="0"/>
+          <a:ext cx="0" cy="0"/>
+          <a:chOff x="0" y="0"/>
+          <a:chExt cx="0" cy="0"/>
+        </a:xfrm>
+      </p:grpSpPr>
+      <p:sp>
+        <p:nvSpPr>
+          <p:cNvPr id="107" name="TextShape 1"/>
+          <p:cNvSpPr txBox="1"/>
+          <p:nvPr/>
+        </p:nvSpPr>
+        <p:spPr>
+          <a:xfrm>
+            <a:off x="838080" y="365040"/>
+            <a:ext cx="10515240" cy="1325520"/>
+          </a:xfrm>
+          <a:prstGeom prst="rect">
+            <a:avLst/>
+          </a:prstGeom>
+        </p:spPr>
+        <p:txBody>
+          <a:bodyPr wrap="none" lIns="0" rIns="0" tIns="0" bIns="0" anchor="ctr"/>
+          <a:p>
+            <a:endParaRPr/>
+          </a:p>
+        </p:txBody>
+      </p:sp>
+      <p:sp>
+        <p:nvSpPr>
+          <p:cNvPr id="108" name="TextShape 2"/>
+          <p:cNvSpPr txBox="1"/>
+          <p:nvPr/>
+        </p:nvSpPr>
+        <p:spPr>
+          <a:xfrm>
+            <a:off x="838080" y="1825560"/>
+            <a:ext cx="10515240" cy="4350960"/>
+          </a:xfrm>
+          <a:prstGeom prst="rect">
+            <a:avLst/>
+          </a:prstGeom>
+        </p:spPr>
+        <p:txBody>
+          <a:bodyPr wrap="none" lIns="0" rIns="0" tIns="0" bIns="0"/>
+          <a:p>
+            <a:endParaRPr/>
+          </a:p>
+        </p:txBody>
+      </p:sp>
+      <p:sp>
+        <p:nvSpPr>
+          <p:cNvPr id="109" name="TextShape 3"/>
+          <p:cNvSpPr txBox="1"/>
+          <p:nvPr/>
+        </p:nvSpPr>
+        <p:spPr>
+          <a:xfrm>
+            <a:off x="838080" y="1825560"/>
+            <a:ext cx="10515240" cy="4350960"/>
+          </a:xfrm>
+          <a:prstGeom prst="rect">
+            <a:avLst/>
+          </a:prstGeom>
+        </p:spPr>
+        <p:txBody>
+          <a:bodyPr wrap="none" lIns="0" rIns="0" tIns="0" bIns="0"/>
+          <a:p>
+            <a:endParaRPr/>
+          </a:p>
+        </p:txBody>
+      </p:sp>
+      <p:pic>
+        <p:nvPicPr>
+          <p:cNvPr id="110" name="" descr=""/>
+          <p:cNvPicPr/>
+          <p:nvPr/>
+        </p:nvPicPr>
+        <p:blipFill>
+          <a:blip r:embed="rId1"/>
+          <a:stretch>
+            <a:fillRect/>
+          </a:stretch>
+        </p:blipFill>
+        <p:spPr>
+          <a:xfrm>
+            <a:off x="3368880" y="1825560"/>
+            <a:ext cx="5452920" cy="4350960"/>
+          </a:xfrm>
+          <a:prstGeom prst="rect">
+            <a:avLst/>
+          </a:prstGeom>
+          <a:ln>
+            <a:noFill/>
+          </a:ln>
+        </p:spPr>
+      </p:pic>
+      <p:pic>
+        <p:nvPicPr>
+          <p:cNvPr id="111" name="" descr=""/>
+          <p:cNvPicPr/>
+          <p:nvPr/>
+        </p:nvPicPr>
+        <p:blipFill>
+          <a:blip r:embed="rId2"/>
+          <a:stretch>
+            <a:fillRect/>
+          </a:stretch>
+        </p:blipFill>
+        <p:spPr>
+          <a:xfrm>
+            <a:off x="3368880" y="1825560"/>
+            <a:ext cx="5452920" cy="4350960"/>
+          </a:xfrm>
+          <a:prstGeom prst="rect">
+            <a:avLst/>
+          </a:prstGeom>
+          <a:ln>
+            <a:noFill/>
+          </a:ln>
+        </p:spPr>
+      </p:pic>
+    </p:spTree>
+  </p:cSld>
 </p:sld>
 </file>
 

</xml_diff>